<commit_message>
CRM Analysis and Visualization
</commit_message>
<xml_diff>
--- a/DA-P90/INDUSTRIAL COMBUSTION ENERGY USE (2).pptx
+++ b/DA-P90/INDUSTRIAL COMBUSTION ENERGY USE (2).pptx
@@ -206,7 +206,7 @@
           <a:p>
             <a:fld id="{5017DCDA-309A-4292-84C5-5568F8FF5D6A}" type="datetimeFigureOut">
               <a:rPr lang="en-IN" smtClean="0"/>
-              <a:t>28-01-2023</a:t>
+              <a:t>16-02-2023</a:t>
             </a:fld>
             <a:endParaRPr lang="en-IN"/>
           </a:p>
@@ -608,7 +608,7 @@
           <a:noFill/>
           <a:extLst>
             <a:ext uri="{909E8E84-426E-40dd-AFC4-6F175D3DCCD1}">
-              <a14:hiddenFill xmlns:a14="http://schemas.microsoft.com/office/drawing/2010/main" xmlns="">
+              <a14:hiddenFill xmlns="" xmlns:a14="http://schemas.microsoft.com/office/drawing/2010/main">
                 <a:solidFill>
                   <a:srgbClr val="FFFFFF"/>
                 </a:solidFill>
@@ -668,7 +668,7 @@
             </a:ln>
             <a:extLst>
               <a:ext uri="{91240B29-F687-4f45-9708-019B960494DF}">
-                <a14:hiddenLine xmlns:a14="http://schemas.microsoft.com/office/drawing/2010/main" xmlns="" w="9525">
+                <a14:hiddenLine xmlns="" xmlns:a14="http://schemas.microsoft.com/office/drawing/2010/main" w="9525">
                   <a:solidFill>
                     <a:srgbClr val="000000"/>
                   </a:solidFill>
@@ -758,7 +758,7 @@
             </a:ln>
             <a:extLst>
               <a:ext uri="{91240B29-F687-4f45-9708-019B960494DF}">
-                <a14:hiddenLine xmlns:a14="http://schemas.microsoft.com/office/drawing/2010/main" xmlns="" w="9525">
+                <a14:hiddenLine xmlns="" xmlns:a14="http://schemas.microsoft.com/office/drawing/2010/main" w="9525">
                   <a:solidFill>
                     <a:srgbClr val="000000"/>
                   </a:solidFill>
@@ -848,7 +848,7 @@
             </a:ln>
             <a:extLst>
               <a:ext uri="{91240B29-F687-4f45-9708-019B960494DF}">
-                <a14:hiddenLine xmlns:a14="http://schemas.microsoft.com/office/drawing/2010/main" xmlns="" w="9525">
+                <a14:hiddenLine xmlns="" xmlns:a14="http://schemas.microsoft.com/office/drawing/2010/main" w="9525">
                   <a:solidFill>
                     <a:srgbClr val="000000"/>
                   </a:solidFill>
@@ -882,7 +882,7 @@
             </a:ln>
             <a:extLst>
               <a:ext uri="{91240B29-F687-4f45-9708-019B960494DF}">
-                <a14:hiddenLine xmlns:a14="http://schemas.microsoft.com/office/drawing/2010/main" xmlns="" w="9525">
+                <a14:hiddenLine xmlns="" xmlns:a14="http://schemas.microsoft.com/office/drawing/2010/main" w="9525">
                   <a:solidFill>
                     <a:srgbClr val="000000"/>
                   </a:solidFill>
@@ -972,7 +972,7 @@
             </a:ln>
             <a:extLst>
               <a:ext uri="{91240B29-F687-4f45-9708-019B960494DF}">
-                <a14:hiddenLine xmlns:a14="http://schemas.microsoft.com/office/drawing/2010/main" xmlns="" w="9525">
+                <a14:hiddenLine xmlns="" xmlns:a14="http://schemas.microsoft.com/office/drawing/2010/main" w="9525">
                   <a:solidFill>
                     <a:srgbClr val="000000"/>
                   </a:solidFill>
@@ -1034,7 +1034,7 @@
             </a:ln>
             <a:extLst>
               <a:ext uri="{91240B29-F687-4f45-9708-019B960494DF}">
-                <a14:hiddenLine xmlns:a14="http://schemas.microsoft.com/office/drawing/2010/main" xmlns="" w="9525">
+                <a14:hiddenLine xmlns="" xmlns:a14="http://schemas.microsoft.com/office/drawing/2010/main" w="9525">
                   <a:solidFill>
                     <a:srgbClr val="000000"/>
                   </a:solidFill>
@@ -1096,7 +1096,7 @@
             </a:ln>
             <a:extLst>
               <a:ext uri="{91240B29-F687-4f45-9708-019B960494DF}">
-                <a14:hiddenLine xmlns:a14="http://schemas.microsoft.com/office/drawing/2010/main" xmlns="" w="9525">
+                <a14:hiddenLine xmlns="" xmlns:a14="http://schemas.microsoft.com/office/drawing/2010/main" w="9525">
                   <a:solidFill>
                     <a:srgbClr val="000000"/>
                   </a:solidFill>
@@ -1186,7 +1186,7 @@
             </a:ln>
             <a:extLst>
               <a:ext uri="{91240B29-F687-4f45-9708-019B960494DF}">
-                <a14:hiddenLine xmlns:a14="http://schemas.microsoft.com/office/drawing/2010/main" xmlns="" w="9525">
+                <a14:hiddenLine xmlns="" xmlns:a14="http://schemas.microsoft.com/office/drawing/2010/main" w="9525">
                   <a:solidFill>
                     <a:srgbClr val="000000"/>
                   </a:solidFill>
@@ -1248,7 +1248,7 @@
             </a:ln>
             <a:extLst>
               <a:ext uri="{91240B29-F687-4f45-9708-019B960494DF}">
-                <a14:hiddenLine xmlns:a14="http://schemas.microsoft.com/office/drawing/2010/main" xmlns="" w="9525">
+                <a14:hiddenLine xmlns="" xmlns:a14="http://schemas.microsoft.com/office/drawing/2010/main" w="9525">
                   <a:solidFill>
                     <a:srgbClr val="000000"/>
                   </a:solidFill>
@@ -1310,7 +1310,7 @@
             </a:ln>
             <a:extLst>
               <a:ext uri="{91240B29-F687-4f45-9708-019B960494DF}">
-                <a14:hiddenLine xmlns:a14="http://schemas.microsoft.com/office/drawing/2010/main" xmlns="" w="9525">
+                <a14:hiddenLine xmlns="" xmlns:a14="http://schemas.microsoft.com/office/drawing/2010/main" w="9525">
                   <a:solidFill>
                     <a:srgbClr val="000000"/>
                   </a:solidFill>
@@ -1400,7 +1400,7 @@
             </a:ln>
             <a:extLst>
               <a:ext uri="{91240B29-F687-4f45-9708-019B960494DF}">
-                <a14:hiddenLine xmlns:a14="http://schemas.microsoft.com/office/drawing/2010/main" xmlns="" w="9525">
+                <a14:hiddenLine xmlns="" xmlns:a14="http://schemas.microsoft.com/office/drawing/2010/main" w="9525">
                   <a:solidFill>
                     <a:srgbClr val="000000"/>
                   </a:solidFill>
@@ -1490,7 +1490,7 @@
             </a:ln>
             <a:extLst>
               <a:ext uri="{91240B29-F687-4f45-9708-019B960494DF}">
-                <a14:hiddenLine xmlns:a14="http://schemas.microsoft.com/office/drawing/2010/main" xmlns="" w="9525">
+                <a14:hiddenLine xmlns="" xmlns:a14="http://schemas.microsoft.com/office/drawing/2010/main" w="9525">
                   <a:solidFill>
                     <a:srgbClr val="000000"/>
                   </a:solidFill>
@@ -1552,7 +1552,7 @@
             </a:ln>
             <a:extLst>
               <a:ext uri="{91240B29-F687-4f45-9708-019B960494DF}">
-                <a14:hiddenLine xmlns:a14="http://schemas.microsoft.com/office/drawing/2010/main" xmlns="" w="9525">
+                <a14:hiddenLine xmlns="" xmlns:a14="http://schemas.microsoft.com/office/drawing/2010/main" w="9525">
                   <a:solidFill>
                     <a:srgbClr val="000000"/>
                   </a:solidFill>
@@ -1662,7 +1662,7 @@
             </a:ln>
             <a:extLst>
               <a:ext uri="{91240B29-F687-4f45-9708-019B960494DF}">
-                <a14:hiddenLine xmlns:a14="http://schemas.microsoft.com/office/drawing/2010/main" xmlns="" w="9525">
+                <a14:hiddenLine xmlns="" xmlns:a14="http://schemas.microsoft.com/office/drawing/2010/main" w="9525">
                   <a:solidFill>
                     <a:srgbClr val="000000"/>
                   </a:solidFill>
@@ -1724,7 +1724,7 @@
             </a:ln>
             <a:extLst>
               <a:ext uri="{91240B29-F687-4f45-9708-019B960494DF}">
-                <a14:hiddenLine xmlns:a14="http://schemas.microsoft.com/office/drawing/2010/main" xmlns="" w="9525">
+                <a14:hiddenLine xmlns="" xmlns:a14="http://schemas.microsoft.com/office/drawing/2010/main" w="9525">
                   <a:solidFill>
                     <a:srgbClr val="000000"/>
                   </a:solidFill>
@@ -1814,7 +1814,7 @@
             </a:ln>
             <a:extLst>
               <a:ext uri="{91240B29-F687-4f45-9708-019B960494DF}">
-                <a14:hiddenLine xmlns:a14="http://schemas.microsoft.com/office/drawing/2010/main" xmlns="" w="9525">
+                <a14:hiddenLine xmlns="" xmlns:a14="http://schemas.microsoft.com/office/drawing/2010/main" w="9525">
                   <a:solidFill>
                     <a:srgbClr val="000000"/>
                   </a:solidFill>
@@ -1904,7 +1904,7 @@
             </a:ln>
             <a:extLst>
               <a:ext uri="{91240B29-F687-4f45-9708-019B960494DF}">
-                <a14:hiddenLine xmlns:a14="http://schemas.microsoft.com/office/drawing/2010/main" xmlns="" w="9525">
+                <a14:hiddenLine xmlns="" xmlns:a14="http://schemas.microsoft.com/office/drawing/2010/main" w="9525">
                   <a:solidFill>
                     <a:srgbClr val="000000"/>
                   </a:solidFill>
@@ -1966,7 +1966,7 @@
             </a:ln>
             <a:extLst>
               <a:ext uri="{91240B29-F687-4f45-9708-019B960494DF}">
-                <a14:hiddenLine xmlns:a14="http://schemas.microsoft.com/office/drawing/2010/main" xmlns="" w="9525">
+                <a14:hiddenLine xmlns="" xmlns:a14="http://schemas.microsoft.com/office/drawing/2010/main" w="9525">
                   <a:solidFill>
                     <a:srgbClr val="000000"/>
                   </a:solidFill>
@@ -2056,7 +2056,7 @@
             </a:ln>
             <a:extLst>
               <a:ext uri="{91240B29-F687-4f45-9708-019B960494DF}">
-                <a14:hiddenLine xmlns:a14="http://schemas.microsoft.com/office/drawing/2010/main" xmlns="" w="9525">
+                <a14:hiddenLine xmlns="" xmlns:a14="http://schemas.microsoft.com/office/drawing/2010/main" w="9525">
                   <a:solidFill>
                     <a:srgbClr val="000000"/>
                   </a:solidFill>
@@ -2146,7 +2146,7 @@
             </a:ln>
             <a:extLst>
               <a:ext uri="{91240B29-F687-4f45-9708-019B960494DF}">
-                <a14:hiddenLine xmlns:a14="http://schemas.microsoft.com/office/drawing/2010/main" xmlns="" w="9525">
+                <a14:hiddenLine xmlns="" xmlns:a14="http://schemas.microsoft.com/office/drawing/2010/main" w="9525">
                   <a:solidFill>
                     <a:srgbClr val="000000"/>
                   </a:solidFill>
@@ -2202,7 +2202,7 @@
             </a:ln>
             <a:extLst>
               <a:ext uri="{91240B29-F687-4f45-9708-019B960494DF}">
-                <a14:hiddenLine xmlns:a14="http://schemas.microsoft.com/office/drawing/2010/main" xmlns="" w="9525">
+                <a14:hiddenLine xmlns="" xmlns:a14="http://schemas.microsoft.com/office/drawing/2010/main" w="9525">
                   <a:solidFill>
                     <a:srgbClr val="000000"/>
                   </a:solidFill>
@@ -2292,7 +2292,7 @@
             </a:ln>
             <a:extLst>
               <a:ext uri="{91240B29-F687-4f45-9708-019B960494DF}">
-                <a14:hiddenLine xmlns:a14="http://schemas.microsoft.com/office/drawing/2010/main" xmlns="" w="9525">
+                <a14:hiddenLine xmlns="" xmlns:a14="http://schemas.microsoft.com/office/drawing/2010/main" w="9525">
                   <a:solidFill>
                     <a:srgbClr val="000000"/>
                   </a:solidFill>
@@ -2348,7 +2348,7 @@
             </a:ln>
             <a:extLst>
               <a:ext uri="{91240B29-F687-4f45-9708-019B960494DF}">
-                <a14:hiddenLine xmlns:a14="http://schemas.microsoft.com/office/drawing/2010/main" xmlns="" w="9525">
+                <a14:hiddenLine xmlns="" xmlns:a14="http://schemas.microsoft.com/office/drawing/2010/main" w="9525">
                   <a:solidFill>
                     <a:srgbClr val="000000"/>
                   </a:solidFill>
@@ -2438,7 +2438,7 @@
             </a:ln>
             <a:extLst>
               <a:ext uri="{91240B29-F687-4f45-9708-019B960494DF}">
-                <a14:hiddenLine xmlns:a14="http://schemas.microsoft.com/office/drawing/2010/main" xmlns="" w="9525">
+                <a14:hiddenLine xmlns="" xmlns:a14="http://schemas.microsoft.com/office/drawing/2010/main" w="9525">
                   <a:solidFill>
                     <a:srgbClr val="000000"/>
                   </a:solidFill>
@@ -2506,7 +2506,7 @@
             </a:ln>
             <a:extLst>
               <a:ext uri="{91240B29-F687-4f45-9708-019B960494DF}">
-                <a14:hiddenLine xmlns:a14="http://schemas.microsoft.com/office/drawing/2010/main" xmlns="" w="9525">
+                <a14:hiddenLine xmlns="" xmlns:a14="http://schemas.microsoft.com/office/drawing/2010/main" w="9525">
                   <a:solidFill>
                     <a:srgbClr val="000000"/>
                   </a:solidFill>
@@ -2596,7 +2596,7 @@
             </a:ln>
             <a:extLst>
               <a:ext uri="{91240B29-F687-4f45-9708-019B960494DF}">
-                <a14:hiddenLine xmlns:a14="http://schemas.microsoft.com/office/drawing/2010/main" xmlns="" w="9525">
+                <a14:hiddenLine xmlns="" xmlns:a14="http://schemas.microsoft.com/office/drawing/2010/main" w="9525">
                   <a:solidFill>
                     <a:srgbClr val="000000"/>
                   </a:solidFill>
@@ -2664,7 +2664,7 @@
             </a:ln>
             <a:extLst>
               <a:ext uri="{91240B29-F687-4f45-9708-019B960494DF}">
-                <a14:hiddenLine xmlns:a14="http://schemas.microsoft.com/office/drawing/2010/main" xmlns="" w="9525">
+                <a14:hiddenLine xmlns="" xmlns:a14="http://schemas.microsoft.com/office/drawing/2010/main" w="9525">
                   <a:solidFill>
                     <a:srgbClr val="000000"/>
                   </a:solidFill>
@@ -2754,7 +2754,7 @@
             </a:ln>
             <a:extLst>
               <a:ext uri="{91240B29-F687-4f45-9708-019B960494DF}">
-                <a14:hiddenLine xmlns:a14="http://schemas.microsoft.com/office/drawing/2010/main" xmlns="" w="9525">
+                <a14:hiddenLine xmlns="" xmlns:a14="http://schemas.microsoft.com/office/drawing/2010/main" w="9525">
                   <a:solidFill>
                     <a:srgbClr val="000000"/>
                   </a:solidFill>
@@ -2788,7 +2788,7 @@
             </a:ln>
             <a:extLst>
               <a:ext uri="{91240B29-F687-4f45-9708-019B960494DF}">
-                <a14:hiddenLine xmlns:a14="http://schemas.microsoft.com/office/drawing/2010/main" xmlns="" w="9525">
+                <a14:hiddenLine xmlns="" xmlns:a14="http://schemas.microsoft.com/office/drawing/2010/main" w="9525">
                   <a:solidFill>
                     <a:srgbClr val="000000"/>
                   </a:solidFill>
@@ -2878,7 +2878,7 @@
             </a:ln>
             <a:extLst>
               <a:ext uri="{91240B29-F687-4f45-9708-019B960494DF}">
-                <a14:hiddenLine xmlns:a14="http://schemas.microsoft.com/office/drawing/2010/main" xmlns="" w="9525">
+                <a14:hiddenLine xmlns="" xmlns:a14="http://schemas.microsoft.com/office/drawing/2010/main" w="9525">
                   <a:solidFill>
                     <a:srgbClr val="000000"/>
                   </a:solidFill>
@@ -2940,7 +2940,7 @@
             </a:ln>
             <a:extLst>
               <a:ext uri="{91240B29-F687-4f45-9708-019B960494DF}">
-                <a14:hiddenLine xmlns:a14="http://schemas.microsoft.com/office/drawing/2010/main" xmlns="" w="9525">
+                <a14:hiddenLine xmlns="" xmlns:a14="http://schemas.microsoft.com/office/drawing/2010/main" w="9525">
                   <a:solidFill>
                     <a:srgbClr val="000000"/>
                   </a:solidFill>
@@ -3002,7 +3002,7 @@
             </a:ln>
             <a:extLst>
               <a:ext uri="{91240B29-F687-4f45-9708-019B960494DF}">
-                <a14:hiddenLine xmlns:a14="http://schemas.microsoft.com/office/drawing/2010/main" xmlns="" w="9525">
+                <a14:hiddenLine xmlns="" xmlns:a14="http://schemas.microsoft.com/office/drawing/2010/main" w="9525">
                   <a:solidFill>
                     <a:srgbClr val="000000"/>
                   </a:solidFill>
@@ -3092,7 +3092,7 @@
             </a:ln>
             <a:extLst>
               <a:ext uri="{91240B29-F687-4f45-9708-019B960494DF}">
-                <a14:hiddenLine xmlns:a14="http://schemas.microsoft.com/office/drawing/2010/main" xmlns="" w="9525">
+                <a14:hiddenLine xmlns="" xmlns:a14="http://schemas.microsoft.com/office/drawing/2010/main" w="9525">
                   <a:solidFill>
                     <a:srgbClr val="000000"/>
                   </a:solidFill>
@@ -3160,7 +3160,7 @@
             </a:ln>
             <a:extLst>
               <a:ext uri="{91240B29-F687-4f45-9708-019B960494DF}">
-                <a14:hiddenLine xmlns:a14="http://schemas.microsoft.com/office/drawing/2010/main" xmlns="" w="9525">
+                <a14:hiddenLine xmlns="" xmlns:a14="http://schemas.microsoft.com/office/drawing/2010/main" w="9525">
                   <a:solidFill>
                     <a:srgbClr val="000000"/>
                   </a:solidFill>
@@ -3222,7 +3222,7 @@
             </a:ln>
             <a:extLst>
               <a:ext uri="{91240B29-F687-4f45-9708-019B960494DF}">
-                <a14:hiddenLine xmlns:a14="http://schemas.microsoft.com/office/drawing/2010/main" xmlns="" w="9525">
+                <a14:hiddenLine xmlns="" xmlns:a14="http://schemas.microsoft.com/office/drawing/2010/main" w="9525">
                   <a:solidFill>
                     <a:srgbClr val="000000"/>
                   </a:solidFill>
@@ -3312,7 +3312,7 @@
             </a:ln>
             <a:extLst>
               <a:ext uri="{91240B29-F687-4f45-9708-019B960494DF}">
-                <a14:hiddenLine xmlns:a14="http://schemas.microsoft.com/office/drawing/2010/main" xmlns="" w="9525">
+                <a14:hiddenLine xmlns="" xmlns:a14="http://schemas.microsoft.com/office/drawing/2010/main" w="9525">
                   <a:solidFill>
                     <a:srgbClr val="000000"/>
                   </a:solidFill>
@@ -3374,7 +3374,7 @@
             </a:ln>
             <a:extLst>
               <a:ext uri="{91240B29-F687-4f45-9708-019B960494DF}">
-                <a14:hiddenLine xmlns:a14="http://schemas.microsoft.com/office/drawing/2010/main" xmlns="" w="9525">
+                <a14:hiddenLine xmlns="" xmlns:a14="http://schemas.microsoft.com/office/drawing/2010/main" w="9525">
                   <a:solidFill>
                     <a:srgbClr val="000000"/>
                   </a:solidFill>
@@ -3464,7 +3464,7 @@
             </a:ln>
             <a:extLst>
               <a:ext uri="{91240B29-F687-4f45-9708-019B960494DF}">
-                <a14:hiddenLine xmlns:a14="http://schemas.microsoft.com/office/drawing/2010/main" xmlns="" w="9525">
+                <a14:hiddenLine xmlns="" xmlns:a14="http://schemas.microsoft.com/office/drawing/2010/main" w="9525">
                   <a:solidFill>
                     <a:srgbClr val="000000"/>
                   </a:solidFill>
@@ -3526,7 +3526,7 @@
             </a:ln>
             <a:extLst>
               <a:ext uri="{91240B29-F687-4f45-9708-019B960494DF}">
-                <a14:hiddenLine xmlns:a14="http://schemas.microsoft.com/office/drawing/2010/main" xmlns="" w="9525">
+                <a14:hiddenLine xmlns="" xmlns:a14="http://schemas.microsoft.com/office/drawing/2010/main" w="9525">
                   <a:solidFill>
                     <a:srgbClr val="000000"/>
                   </a:solidFill>
@@ -3616,7 +3616,7 @@
             </a:ln>
             <a:extLst>
               <a:ext uri="{91240B29-F687-4f45-9708-019B960494DF}">
-                <a14:hiddenLine xmlns:a14="http://schemas.microsoft.com/office/drawing/2010/main" xmlns="" w="9525">
+                <a14:hiddenLine xmlns="" xmlns:a14="http://schemas.microsoft.com/office/drawing/2010/main" w="9525">
                   <a:solidFill>
                     <a:srgbClr val="000000"/>
                   </a:solidFill>
@@ -3650,7 +3650,7 @@
             </a:ln>
             <a:extLst>
               <a:ext uri="{91240B29-F687-4f45-9708-019B960494DF}">
-                <a14:hiddenLine xmlns:a14="http://schemas.microsoft.com/office/drawing/2010/main" xmlns="" w="9525">
+                <a14:hiddenLine xmlns="" xmlns:a14="http://schemas.microsoft.com/office/drawing/2010/main" w="9525">
                   <a:solidFill>
                     <a:srgbClr val="000000"/>
                   </a:solidFill>
@@ -3715,7 +3715,7 @@
             </a:ln>
             <a:extLst>
               <a:ext uri="{91240B29-F687-4f45-9708-019B960494DF}">
-                <a14:hiddenLine xmlns:a14="http://schemas.microsoft.com/office/drawing/2010/main" xmlns="" w="9525">
+                <a14:hiddenLine xmlns="" xmlns:a14="http://schemas.microsoft.com/office/drawing/2010/main" w="9525">
                   <a:solidFill>
                     <a:srgbClr val="000000"/>
                   </a:solidFill>
@@ -3805,7 +3805,7 @@
             </a:ln>
             <a:extLst>
               <a:ext uri="{91240B29-F687-4f45-9708-019B960494DF}">
-                <a14:hiddenLine xmlns:a14="http://schemas.microsoft.com/office/drawing/2010/main" xmlns="" w="9525">
+                <a14:hiddenLine xmlns="" xmlns:a14="http://schemas.microsoft.com/office/drawing/2010/main" w="9525">
                   <a:solidFill>
                     <a:srgbClr val="000000"/>
                   </a:solidFill>
@@ -3867,7 +3867,7 @@
             </a:ln>
             <a:extLst>
               <a:ext uri="{91240B29-F687-4f45-9708-019B960494DF}">
-                <a14:hiddenLine xmlns:a14="http://schemas.microsoft.com/office/drawing/2010/main" xmlns="" w="9525">
+                <a14:hiddenLine xmlns="" xmlns:a14="http://schemas.microsoft.com/office/drawing/2010/main" w="9525">
                   <a:solidFill>
                     <a:srgbClr val="000000"/>
                   </a:solidFill>
@@ -3957,7 +3957,7 @@
             </a:ln>
             <a:extLst>
               <a:ext uri="{91240B29-F687-4f45-9708-019B960494DF}">
-                <a14:hiddenLine xmlns:a14="http://schemas.microsoft.com/office/drawing/2010/main" xmlns="" w="9525">
+                <a14:hiddenLine xmlns="" xmlns:a14="http://schemas.microsoft.com/office/drawing/2010/main" w="9525">
                   <a:solidFill>
                     <a:srgbClr val="000000"/>
                   </a:solidFill>
@@ -4047,7 +4047,7 @@
             </a:ln>
             <a:extLst>
               <a:ext uri="{91240B29-F687-4f45-9708-019B960494DF}">
-                <a14:hiddenLine xmlns:a14="http://schemas.microsoft.com/office/drawing/2010/main" xmlns="" w="9525">
+                <a14:hiddenLine xmlns="" xmlns:a14="http://schemas.microsoft.com/office/drawing/2010/main" w="9525">
                   <a:solidFill>
                     <a:srgbClr val="000000"/>
                   </a:solidFill>
@@ -4112,7 +4112,7 @@
             </a:ln>
             <a:extLst>
               <a:ext uri="{91240B29-F687-4f45-9708-019B960494DF}">
-                <a14:hiddenLine xmlns:a14="http://schemas.microsoft.com/office/drawing/2010/main" xmlns="" w="9525">
+                <a14:hiddenLine xmlns="" xmlns:a14="http://schemas.microsoft.com/office/drawing/2010/main" w="9525">
                   <a:solidFill>
                     <a:srgbClr val="000000"/>
                   </a:solidFill>
@@ -4174,7 +4174,7 @@
             </a:ln>
             <a:extLst>
               <a:ext uri="{91240B29-F687-4f45-9708-019B960494DF}">
-                <a14:hiddenLine xmlns:a14="http://schemas.microsoft.com/office/drawing/2010/main" xmlns="" w="9525">
+                <a14:hiddenLine xmlns="" xmlns:a14="http://schemas.microsoft.com/office/drawing/2010/main" w="9525">
                   <a:solidFill>
                     <a:srgbClr val="000000"/>
                   </a:solidFill>
@@ -4264,7 +4264,7 @@
             </a:ln>
             <a:extLst>
               <a:ext uri="{91240B29-F687-4f45-9708-019B960494DF}">
-                <a14:hiddenLine xmlns:a14="http://schemas.microsoft.com/office/drawing/2010/main" xmlns="" w="9525">
+                <a14:hiddenLine xmlns="" xmlns:a14="http://schemas.microsoft.com/office/drawing/2010/main" w="9525">
                   <a:solidFill>
                     <a:srgbClr val="000000"/>
                   </a:solidFill>
@@ -4354,7 +4354,7 @@
             </a:ln>
             <a:extLst>
               <a:ext uri="{91240B29-F687-4f45-9708-019B960494DF}">
-                <a14:hiddenLine xmlns:a14="http://schemas.microsoft.com/office/drawing/2010/main" xmlns="" w="9525">
+                <a14:hiddenLine xmlns="" xmlns:a14="http://schemas.microsoft.com/office/drawing/2010/main" w="9525">
                   <a:solidFill>
                     <a:srgbClr val="000000"/>
                   </a:solidFill>
@@ -4416,7 +4416,7 @@
             </a:ln>
             <a:extLst>
               <a:ext uri="{91240B29-F687-4f45-9708-019B960494DF}">
-                <a14:hiddenLine xmlns:a14="http://schemas.microsoft.com/office/drawing/2010/main" xmlns="" w="9525">
+                <a14:hiddenLine xmlns="" xmlns:a14="http://schemas.microsoft.com/office/drawing/2010/main" w="9525">
                   <a:solidFill>
                     <a:srgbClr val="000000"/>
                   </a:solidFill>
@@ -4536,7 +4536,7 @@
             </a:ln>
             <a:extLst>
               <a:ext uri="{91240B29-F687-4f45-9708-019B960494DF}">
-                <a14:hiddenLine xmlns:a14="http://schemas.microsoft.com/office/drawing/2010/main" xmlns="" w="9525">
+                <a14:hiddenLine xmlns="" xmlns:a14="http://schemas.microsoft.com/office/drawing/2010/main" w="9525">
                   <a:solidFill>
                     <a:srgbClr val="000000"/>
                   </a:solidFill>
@@ -4604,7 +4604,7 @@
             </a:ln>
             <a:extLst>
               <a:ext uri="{91240B29-F687-4f45-9708-019B960494DF}">
-                <a14:hiddenLine xmlns:a14="http://schemas.microsoft.com/office/drawing/2010/main" xmlns="" w="9525">
+                <a14:hiddenLine xmlns="" xmlns:a14="http://schemas.microsoft.com/office/drawing/2010/main" w="9525">
                   <a:solidFill>
                     <a:srgbClr val="000000"/>
                   </a:solidFill>
@@ -4694,7 +4694,7 @@
             </a:ln>
             <a:extLst>
               <a:ext uri="{91240B29-F687-4f45-9708-019B960494DF}">
-                <a14:hiddenLine xmlns:a14="http://schemas.microsoft.com/office/drawing/2010/main" xmlns="" w="9525">
+                <a14:hiddenLine xmlns="" xmlns:a14="http://schemas.microsoft.com/office/drawing/2010/main" w="9525">
                   <a:solidFill>
                     <a:srgbClr val="000000"/>
                   </a:solidFill>
@@ -4834,7 +4834,7 @@
           <a:p>
             <a:fld id="{C0635E31-B3E6-4946-9064-E4B2013B5151}" type="datetime1">
               <a:rPr lang="en-US" smtClean="0"/>
-              <a:t>1/28/2023</a:t>
+              <a:t>2/16/2023</a:t>
             </a:fld>
             <a:endParaRPr lang="en-US" dirty="0"/>
           </a:p>
@@ -5096,7 +5096,7 @@
           <a:p>
             <a:fld id="{0EB18AA7-E588-4C89-BDB4-0FBE0FCC9491}" type="datetime1">
               <a:rPr lang="en-US" smtClean="0"/>
-              <a:t>1/28/2023</a:t>
+              <a:t>2/16/2023</a:t>
             </a:fld>
             <a:endParaRPr lang="en-US" dirty="0"/>
           </a:p>
@@ -5287,7 +5287,7 @@
           <a:p>
             <a:fld id="{12BA31C3-3E77-484D-9E5C-59FCBD4D2285}" type="datetime1">
               <a:rPr lang="en-US" smtClean="0"/>
-              <a:t>1/28/2023</a:t>
+              <a:t>2/16/2023</a:t>
             </a:fld>
             <a:endParaRPr lang="en-US" dirty="0"/>
           </a:p>
@@ -5545,7 +5545,7 @@
           <a:p>
             <a:fld id="{8210626F-C722-4E5E-851D-C363470F3691}" type="datetime1">
               <a:rPr lang="en-US" smtClean="0"/>
-              <a:t>1/28/2023</a:t>
+              <a:t>2/16/2023</a:t>
             </a:fld>
             <a:endParaRPr lang="en-US" dirty="0"/>
           </a:p>
@@ -5974,7 +5974,7 @@
           <a:p>
             <a:fld id="{9060F011-7430-41E9-A997-765C60CDD89A}" type="datetime1">
               <a:rPr lang="en-US" smtClean="0"/>
-              <a:t>1/28/2023</a:t>
+              <a:t>2/16/2023</a:t>
             </a:fld>
             <a:endParaRPr lang="en-US" dirty="0"/>
           </a:p>
@@ -6515,7 +6515,7 @@
           <a:p>
             <a:fld id="{8F084E12-98ED-450E-8B6D-63BB7DEDC51B}" type="datetime1">
               <a:rPr lang="en-US" smtClean="0"/>
-              <a:t>1/28/2023</a:t>
+              <a:t>2/16/2023</a:t>
             </a:fld>
             <a:endParaRPr lang="en-US" dirty="0"/>
           </a:p>
@@ -7230,7 +7230,7 @@
           <a:p>
             <a:fld id="{57EB220E-F969-481C-8D8A-BD39E680CCB0}" type="datetime1">
               <a:rPr lang="en-US" smtClean="0"/>
-              <a:t>1/28/2023</a:t>
+              <a:t>2/16/2023</a:t>
             </a:fld>
             <a:endParaRPr lang="en-US" dirty="0"/>
           </a:p>
@@ -7395,7 +7395,7 @@
           <a:p>
             <a:fld id="{9EA0A8AC-BE54-43BF-9CD4-480880458E7A}" type="datetime1">
               <a:rPr lang="en-US" smtClean="0"/>
-              <a:t>1/28/2023</a:t>
+              <a:t>2/16/2023</a:t>
             </a:fld>
             <a:endParaRPr lang="en-US" dirty="0"/>
           </a:p>
@@ -7570,7 +7570,7 @@
           <a:p>
             <a:fld id="{E22A3322-8D2C-4DDC-9680-7BF3FC8E4BF7}" type="datetime1">
               <a:rPr lang="en-US" smtClean="0"/>
-              <a:t>1/28/2023</a:t>
+              <a:t>2/16/2023</a:t>
             </a:fld>
             <a:endParaRPr lang="en-US" dirty="0"/>
           </a:p>
@@ -7735,7 +7735,7 @@
           <a:p>
             <a:fld id="{9AE311ED-5387-4141-A472-1AF0EDA94F17}" type="datetime1">
               <a:rPr lang="en-US" smtClean="0"/>
-              <a:t>1/28/2023</a:t>
+              <a:t>2/16/2023</a:t>
             </a:fld>
             <a:endParaRPr lang="en-US" dirty="0"/>
           </a:p>
@@ -7980,7 +7980,7 @@
           <a:p>
             <a:fld id="{5592B215-972F-44F1-9210-7DCBC1F3BAA8}" type="datetime1">
               <a:rPr lang="en-US" smtClean="0"/>
-              <a:t>1/28/2023</a:t>
+              <a:t>2/16/2023</a:t>
             </a:fld>
             <a:endParaRPr lang="en-US" dirty="0"/>
           </a:p>
@@ -8207,7 +8207,7 @@
           <a:p>
             <a:fld id="{91602661-91AC-4414-AFA3-87DB19E3EE5A}" type="datetime1">
               <a:rPr lang="en-US" smtClean="0"/>
-              <a:t>1/28/2023</a:t>
+              <a:t>2/16/2023</a:t>
             </a:fld>
             <a:endParaRPr lang="en-US" dirty="0"/>
           </a:p>
@@ -8583,7 +8583,7 @@
           <a:p>
             <a:fld id="{ED78979E-3BBD-4E30-8575-F1E3FD5D7033}" type="datetime1">
               <a:rPr lang="en-US" smtClean="0"/>
-              <a:t>1/28/2023</a:t>
+              <a:t>2/16/2023</a:t>
             </a:fld>
             <a:endParaRPr lang="en-US" dirty="0"/>
           </a:p>
@@ -8696,7 +8696,7 @@
           <a:p>
             <a:fld id="{5F2C0811-6C37-4257-ACC3-5DF418F47237}" type="datetime1">
               <a:rPr lang="en-US" smtClean="0"/>
-              <a:t>1/28/2023</a:t>
+              <a:t>2/16/2023</a:t>
             </a:fld>
             <a:endParaRPr lang="en-US" dirty="0"/>
           </a:p>
@@ -8786,7 +8786,7 @@
           <a:p>
             <a:fld id="{7CCC6971-0EAA-4060-9076-48B36D1F172A}" type="datetime1">
               <a:rPr lang="en-US" smtClean="0"/>
-              <a:t>1/28/2023</a:t>
+              <a:t>2/16/2023</a:t>
             </a:fld>
             <a:endParaRPr lang="en-US" dirty="0"/>
           </a:p>
@@ -9030,7 +9030,7 @@
           <a:p>
             <a:fld id="{F00FB27F-8706-4F0A-9A92-58F9B86F7FDD}" type="datetime1">
               <a:rPr lang="en-US" smtClean="0"/>
-              <a:t>1/28/2023</a:t>
+              <a:t>2/16/2023</a:t>
             </a:fld>
             <a:endParaRPr lang="en-US" dirty="0"/>
           </a:p>
@@ -9305,7 +9305,7 @@
           <a:p>
             <a:fld id="{3A142965-FC28-4B6B-BABC-43A1D9EE851F}" type="datetime1">
               <a:rPr lang="en-US" smtClean="0"/>
-              <a:t>1/28/2023</a:t>
+              <a:t>2/16/2023</a:t>
             </a:fld>
             <a:endParaRPr lang="en-US" dirty="0"/>
           </a:p>
@@ -9449,7 +9449,7 @@
           <a:noFill/>
           <a:extLst>
             <a:ext uri="{909E8E84-426E-40dd-AFC4-6F175D3DCCD1}">
-              <a14:hiddenFill xmlns:a14="http://schemas.microsoft.com/office/drawing/2010/main" xmlns="">
+              <a14:hiddenFill xmlns="" xmlns:a14="http://schemas.microsoft.com/office/drawing/2010/main">
                 <a:solidFill>
                   <a:srgbClr val="FFFFFF"/>
                 </a:solidFill>
@@ -9523,7 +9523,7 @@
               </a:ln>
               <a:extLst>
                 <a:ext uri="{91240B29-F687-4f45-9708-019B960494DF}">
-                  <a14:hiddenLine xmlns:a14="http://schemas.microsoft.com/office/drawing/2010/main" xmlns="" w="9525">
+                  <a14:hiddenLine xmlns="" xmlns:a14="http://schemas.microsoft.com/office/drawing/2010/main" w="9525">
                     <a:solidFill>
                       <a:srgbClr val="000000"/>
                     </a:solidFill>
@@ -9613,7 +9613,7 @@
               </a:ln>
               <a:extLst>
                 <a:ext uri="{91240B29-F687-4f45-9708-019B960494DF}">
-                  <a14:hiddenLine xmlns:a14="http://schemas.microsoft.com/office/drawing/2010/main" xmlns="" w="9525">
+                  <a14:hiddenLine xmlns="" xmlns:a14="http://schemas.microsoft.com/office/drawing/2010/main" w="9525">
                     <a:solidFill>
                       <a:srgbClr val="000000"/>
                     </a:solidFill>
@@ -9703,7 +9703,7 @@
               </a:ln>
               <a:extLst>
                 <a:ext uri="{91240B29-F687-4f45-9708-019B960494DF}">
-                  <a14:hiddenLine xmlns:a14="http://schemas.microsoft.com/office/drawing/2010/main" xmlns="" w="9525">
+                  <a14:hiddenLine xmlns="" xmlns:a14="http://schemas.microsoft.com/office/drawing/2010/main" w="9525">
                     <a:solidFill>
                       <a:srgbClr val="000000"/>
                     </a:solidFill>
@@ -9765,7 +9765,7 @@
               </a:ln>
               <a:extLst>
                 <a:ext uri="{91240B29-F687-4f45-9708-019B960494DF}">
-                  <a14:hiddenLine xmlns:a14="http://schemas.microsoft.com/office/drawing/2010/main" xmlns="" w="9525">
+                  <a14:hiddenLine xmlns="" xmlns:a14="http://schemas.microsoft.com/office/drawing/2010/main" w="9525">
                     <a:solidFill>
                       <a:srgbClr val="000000"/>
                     </a:solidFill>
@@ -9855,7 +9855,7 @@
               </a:ln>
               <a:extLst>
                 <a:ext uri="{91240B29-F687-4f45-9708-019B960494DF}">
-                  <a14:hiddenLine xmlns:a14="http://schemas.microsoft.com/office/drawing/2010/main" xmlns="" w="9525">
+                  <a14:hiddenLine xmlns="" xmlns:a14="http://schemas.microsoft.com/office/drawing/2010/main" w="9525">
                     <a:solidFill>
                       <a:srgbClr val="000000"/>
                     </a:solidFill>
@@ -9917,7 +9917,7 @@
               </a:ln>
               <a:extLst>
                 <a:ext uri="{91240B29-F687-4f45-9708-019B960494DF}">
-                  <a14:hiddenLine xmlns:a14="http://schemas.microsoft.com/office/drawing/2010/main" xmlns="" w="9525">
+                  <a14:hiddenLine xmlns="" xmlns:a14="http://schemas.microsoft.com/office/drawing/2010/main" w="9525">
                     <a:solidFill>
                       <a:srgbClr val="000000"/>
                     </a:solidFill>
@@ -9979,7 +9979,7 @@
               </a:ln>
               <a:extLst>
                 <a:ext uri="{91240B29-F687-4f45-9708-019B960494DF}">
-                  <a14:hiddenLine xmlns:a14="http://schemas.microsoft.com/office/drawing/2010/main" xmlns="" w="9525">
+                  <a14:hiddenLine xmlns="" xmlns:a14="http://schemas.microsoft.com/office/drawing/2010/main" w="9525">
                     <a:solidFill>
                       <a:srgbClr val="000000"/>
                     </a:solidFill>
@@ -10069,7 +10069,7 @@
               </a:ln>
               <a:extLst>
                 <a:ext uri="{91240B29-F687-4f45-9708-019B960494DF}">
-                  <a14:hiddenLine xmlns:a14="http://schemas.microsoft.com/office/drawing/2010/main" xmlns="" w="9525">
+                  <a14:hiddenLine xmlns="" xmlns:a14="http://schemas.microsoft.com/office/drawing/2010/main" w="9525">
                     <a:solidFill>
                       <a:srgbClr val="000000"/>
                     </a:solidFill>
@@ -10159,7 +10159,7 @@
               </a:ln>
               <a:extLst>
                 <a:ext uri="{91240B29-F687-4f45-9708-019B960494DF}">
-                  <a14:hiddenLine xmlns:a14="http://schemas.microsoft.com/office/drawing/2010/main" xmlns="" w="9525">
+                  <a14:hiddenLine xmlns="" xmlns:a14="http://schemas.microsoft.com/office/drawing/2010/main" w="9525">
                     <a:solidFill>
                       <a:srgbClr val="000000"/>
                     </a:solidFill>
@@ -10221,7 +10221,7 @@
               </a:ln>
               <a:extLst>
                 <a:ext uri="{91240B29-F687-4f45-9708-019B960494DF}">
-                  <a14:hiddenLine xmlns:a14="http://schemas.microsoft.com/office/drawing/2010/main" xmlns="" w="9525">
+                  <a14:hiddenLine xmlns="" xmlns:a14="http://schemas.microsoft.com/office/drawing/2010/main" w="9525">
                     <a:solidFill>
                       <a:srgbClr val="000000"/>
                     </a:solidFill>
@@ -10331,7 +10331,7 @@
               </a:ln>
               <a:extLst>
                 <a:ext uri="{91240B29-F687-4f45-9708-019B960494DF}">
-                  <a14:hiddenLine xmlns:a14="http://schemas.microsoft.com/office/drawing/2010/main" xmlns="" w="9525">
+                  <a14:hiddenLine xmlns="" xmlns:a14="http://schemas.microsoft.com/office/drawing/2010/main" w="9525">
                     <a:solidFill>
                       <a:srgbClr val="000000"/>
                     </a:solidFill>
@@ -10415,7 +10415,7 @@
               </a:ln>
               <a:extLst>
                 <a:ext uri="{91240B29-F687-4f45-9708-019B960494DF}">
-                  <a14:hiddenLine xmlns:a14="http://schemas.microsoft.com/office/drawing/2010/main" xmlns="" w="9525">
+                  <a14:hiddenLine xmlns="" xmlns:a14="http://schemas.microsoft.com/office/drawing/2010/main" w="9525">
                     <a:solidFill>
                       <a:srgbClr val="000000"/>
                     </a:solidFill>
@@ -10477,7 +10477,7 @@
               </a:ln>
               <a:extLst>
                 <a:ext uri="{91240B29-F687-4f45-9708-019B960494DF}">
-                  <a14:hiddenLine xmlns:a14="http://schemas.microsoft.com/office/drawing/2010/main" xmlns="" w="9525">
+                  <a14:hiddenLine xmlns="" xmlns:a14="http://schemas.microsoft.com/office/drawing/2010/main" w="9525">
                     <a:solidFill>
                       <a:srgbClr val="000000"/>
                     </a:solidFill>
@@ -10539,7 +10539,7 @@
               </a:ln>
               <a:extLst>
                 <a:ext uri="{91240B29-F687-4f45-9708-019B960494DF}">
-                  <a14:hiddenLine xmlns:a14="http://schemas.microsoft.com/office/drawing/2010/main" xmlns="" w="9525">
+                  <a14:hiddenLine xmlns="" xmlns:a14="http://schemas.microsoft.com/office/drawing/2010/main" w="9525">
                     <a:solidFill>
                       <a:srgbClr val="000000"/>
                     </a:solidFill>
@@ -10629,7 +10629,7 @@
               </a:ln>
               <a:extLst>
                 <a:ext uri="{91240B29-F687-4f45-9708-019B960494DF}">
-                  <a14:hiddenLine xmlns:a14="http://schemas.microsoft.com/office/drawing/2010/main" xmlns="" w="9525">
+                  <a14:hiddenLine xmlns="" xmlns:a14="http://schemas.microsoft.com/office/drawing/2010/main" w="9525">
                     <a:solidFill>
                       <a:srgbClr val="000000"/>
                     </a:solidFill>
@@ -10663,7 +10663,7 @@
               </a:ln>
               <a:extLst>
                 <a:ext uri="{91240B29-F687-4f45-9708-019B960494DF}">
-                  <a14:hiddenLine xmlns:a14="http://schemas.microsoft.com/office/drawing/2010/main" xmlns="" w="9525">
+                  <a14:hiddenLine xmlns="" xmlns:a14="http://schemas.microsoft.com/office/drawing/2010/main" w="9525">
                     <a:solidFill>
                       <a:srgbClr val="000000"/>
                     </a:solidFill>
@@ -10728,7 +10728,7 @@
               </a:ln>
               <a:extLst>
                 <a:ext uri="{91240B29-F687-4f45-9708-019B960494DF}">
-                  <a14:hiddenLine xmlns:a14="http://schemas.microsoft.com/office/drawing/2010/main" xmlns="" w="9525">
+                  <a14:hiddenLine xmlns="" xmlns:a14="http://schemas.microsoft.com/office/drawing/2010/main" w="9525">
                     <a:solidFill>
                       <a:srgbClr val="000000"/>
                     </a:solidFill>
@@ -10818,7 +10818,7 @@
               </a:ln>
               <a:extLst>
                 <a:ext uri="{91240B29-F687-4f45-9708-019B960494DF}">
-                  <a14:hiddenLine xmlns:a14="http://schemas.microsoft.com/office/drawing/2010/main" xmlns="" w="9525">
+                  <a14:hiddenLine xmlns="" xmlns:a14="http://schemas.microsoft.com/office/drawing/2010/main" w="9525">
                     <a:solidFill>
                       <a:srgbClr val="000000"/>
                     </a:solidFill>
@@ -10880,7 +10880,7 @@
               </a:ln>
               <a:extLst>
                 <a:ext uri="{91240B29-F687-4f45-9708-019B960494DF}">
-                  <a14:hiddenLine xmlns:a14="http://schemas.microsoft.com/office/drawing/2010/main" xmlns="" w="9525">
+                  <a14:hiddenLine xmlns="" xmlns:a14="http://schemas.microsoft.com/office/drawing/2010/main" w="9525">
                     <a:solidFill>
                       <a:srgbClr val="000000"/>
                     </a:solidFill>
@@ -10970,7 +10970,7 @@
               </a:ln>
               <a:extLst>
                 <a:ext uri="{91240B29-F687-4f45-9708-019B960494DF}">
-                  <a14:hiddenLine xmlns:a14="http://schemas.microsoft.com/office/drawing/2010/main" xmlns="" w="9525">
+                  <a14:hiddenLine xmlns="" xmlns:a14="http://schemas.microsoft.com/office/drawing/2010/main" w="9525">
                     <a:solidFill>
                       <a:srgbClr val="000000"/>
                     </a:solidFill>
@@ -11035,7 +11035,7 @@
               </a:ln>
               <a:extLst>
                 <a:ext uri="{91240B29-F687-4f45-9708-019B960494DF}">
-                  <a14:hiddenLine xmlns:a14="http://schemas.microsoft.com/office/drawing/2010/main" xmlns="" w="9525">
+                  <a14:hiddenLine xmlns="" xmlns:a14="http://schemas.microsoft.com/office/drawing/2010/main" w="9525">
                     <a:solidFill>
                       <a:srgbClr val="000000"/>
                     </a:solidFill>
@@ -11097,7 +11097,7 @@
               </a:ln>
               <a:extLst>
                 <a:ext uri="{91240B29-F687-4f45-9708-019B960494DF}">
-                  <a14:hiddenLine xmlns:a14="http://schemas.microsoft.com/office/drawing/2010/main" xmlns="" w="9525">
+                  <a14:hiddenLine xmlns="" xmlns:a14="http://schemas.microsoft.com/office/drawing/2010/main" w="9525">
                     <a:solidFill>
                       <a:srgbClr val="000000"/>
                     </a:solidFill>
@@ -11187,7 +11187,7 @@
               </a:ln>
               <a:extLst>
                 <a:ext uri="{91240B29-F687-4f45-9708-019B960494DF}">
-                  <a14:hiddenLine xmlns:a14="http://schemas.microsoft.com/office/drawing/2010/main" xmlns="" w="9525">
+                  <a14:hiddenLine xmlns="" xmlns:a14="http://schemas.microsoft.com/office/drawing/2010/main" w="9525">
                     <a:solidFill>
                       <a:srgbClr val="000000"/>
                     </a:solidFill>
@@ -11277,7 +11277,7 @@
               </a:ln>
               <a:extLst>
                 <a:ext uri="{91240B29-F687-4f45-9708-019B960494DF}">
-                  <a14:hiddenLine xmlns:a14="http://schemas.microsoft.com/office/drawing/2010/main" xmlns="" w="9525">
+                  <a14:hiddenLine xmlns="" xmlns:a14="http://schemas.microsoft.com/office/drawing/2010/main" w="9525">
                     <a:solidFill>
                       <a:srgbClr val="000000"/>
                     </a:solidFill>
@@ -11342,7 +11342,7 @@
               </a:ln>
               <a:extLst>
                 <a:ext uri="{91240B29-F687-4f45-9708-019B960494DF}">
-                  <a14:hiddenLine xmlns:a14="http://schemas.microsoft.com/office/drawing/2010/main" xmlns="" w="9525">
+                  <a14:hiddenLine xmlns="" xmlns:a14="http://schemas.microsoft.com/office/drawing/2010/main" w="9525">
                     <a:solidFill>
                       <a:srgbClr val="000000"/>
                     </a:solidFill>
@@ -11462,7 +11462,7 @@
               </a:ln>
               <a:extLst>
                 <a:ext uri="{91240B29-F687-4f45-9708-019B960494DF}">
-                  <a14:hiddenLine xmlns:a14="http://schemas.microsoft.com/office/drawing/2010/main" xmlns="" w="9525">
+                  <a14:hiddenLine xmlns="" xmlns:a14="http://schemas.microsoft.com/office/drawing/2010/main" w="9525">
                     <a:solidFill>
                       <a:srgbClr val="000000"/>
                     </a:solidFill>
@@ -11560,7 +11560,7 @@
               </a:ln>
               <a:extLst>
                 <a:ext uri="{91240B29-F687-4f45-9708-019B960494DF}">
-                  <a14:hiddenLine xmlns:a14="http://schemas.microsoft.com/office/drawing/2010/main" xmlns="" w="9525">
+                  <a14:hiddenLine xmlns="" xmlns:a14="http://schemas.microsoft.com/office/drawing/2010/main" w="9525">
                     <a:solidFill>
                       <a:srgbClr val="000000"/>
                     </a:solidFill>
@@ -11675,7 +11675,7 @@
               </a:ln>
               <a:extLst>
                 <a:ext uri="{91240B29-F687-4f45-9708-019B960494DF}">
-                  <a14:hiddenLine xmlns:a14="http://schemas.microsoft.com/office/drawing/2010/main" xmlns="" w="9525">
+                  <a14:hiddenLine xmlns="" xmlns:a14="http://schemas.microsoft.com/office/drawing/2010/main" w="9525">
                     <a:solidFill>
                       <a:srgbClr val="000000"/>
                     </a:solidFill>
@@ -11765,7 +11765,7 @@
               </a:ln>
               <a:extLst>
                 <a:ext uri="{91240B29-F687-4f45-9708-019B960494DF}">
-                  <a14:hiddenLine xmlns:a14="http://schemas.microsoft.com/office/drawing/2010/main" xmlns="" w="9525">
+                  <a14:hiddenLine xmlns="" xmlns:a14="http://schemas.microsoft.com/office/drawing/2010/main" w="9525">
                     <a:solidFill>
                       <a:srgbClr val="000000"/>
                     </a:solidFill>
@@ -11830,7 +11830,7 @@
               </a:ln>
               <a:extLst>
                 <a:ext uri="{91240B29-F687-4f45-9708-019B960494DF}">
-                  <a14:hiddenLine xmlns:a14="http://schemas.microsoft.com/office/drawing/2010/main" xmlns="" w="9525">
+                  <a14:hiddenLine xmlns="" xmlns:a14="http://schemas.microsoft.com/office/drawing/2010/main" w="9525">
                     <a:solidFill>
                       <a:srgbClr val="000000"/>
                     </a:solidFill>
@@ -11920,7 +11920,7 @@
               </a:ln>
               <a:extLst>
                 <a:ext uri="{91240B29-F687-4f45-9708-019B960494DF}">
-                  <a14:hiddenLine xmlns:a14="http://schemas.microsoft.com/office/drawing/2010/main" xmlns="" w="9525">
+                  <a14:hiddenLine xmlns="" xmlns:a14="http://schemas.microsoft.com/office/drawing/2010/main" w="9525">
                     <a:solidFill>
                       <a:srgbClr val="000000"/>
                     </a:solidFill>
@@ -11988,7 +11988,7 @@
               </a:ln>
               <a:extLst>
                 <a:ext uri="{91240B29-F687-4f45-9708-019B960494DF}">
-                  <a14:hiddenLine xmlns:a14="http://schemas.microsoft.com/office/drawing/2010/main" xmlns="" w="9525">
+                  <a14:hiddenLine xmlns="" xmlns:a14="http://schemas.microsoft.com/office/drawing/2010/main" w="9525">
                     <a:solidFill>
                       <a:srgbClr val="000000"/>
                     </a:solidFill>
@@ -12078,7 +12078,7 @@
               </a:ln>
               <a:extLst>
                 <a:ext uri="{91240B29-F687-4f45-9708-019B960494DF}">
-                  <a14:hiddenLine xmlns:a14="http://schemas.microsoft.com/office/drawing/2010/main" xmlns="" w="9525">
+                  <a14:hiddenLine xmlns="" xmlns:a14="http://schemas.microsoft.com/office/drawing/2010/main" w="9525">
                     <a:solidFill>
                       <a:srgbClr val="000000"/>
                     </a:solidFill>
@@ -12146,7 +12146,7 @@
               </a:ln>
               <a:extLst>
                 <a:ext uri="{91240B29-F687-4f45-9708-019B960494DF}">
-                  <a14:hiddenLine xmlns:a14="http://schemas.microsoft.com/office/drawing/2010/main" xmlns="" w="9525">
+                  <a14:hiddenLine xmlns="" xmlns:a14="http://schemas.microsoft.com/office/drawing/2010/main" w="9525">
                     <a:solidFill>
                       <a:srgbClr val="000000"/>
                     </a:solidFill>
@@ -12236,7 +12236,7 @@
               </a:ln>
               <a:extLst>
                 <a:ext uri="{91240B29-F687-4f45-9708-019B960494DF}">
-                  <a14:hiddenLine xmlns:a14="http://schemas.microsoft.com/office/drawing/2010/main" xmlns="" w="9525">
+                  <a14:hiddenLine xmlns="" xmlns:a14="http://schemas.microsoft.com/office/drawing/2010/main" w="9525">
                     <a:solidFill>
                       <a:srgbClr val="000000"/>
                     </a:solidFill>
@@ -12270,7 +12270,7 @@
               </a:ln>
               <a:extLst>
                 <a:ext uri="{91240B29-F687-4f45-9708-019B960494DF}">
-                  <a14:hiddenLine xmlns:a14="http://schemas.microsoft.com/office/drawing/2010/main" xmlns="" w="9525">
+                  <a14:hiddenLine xmlns="" xmlns:a14="http://schemas.microsoft.com/office/drawing/2010/main" w="9525">
                     <a:solidFill>
                       <a:srgbClr val="000000"/>
                     </a:solidFill>
@@ -12410,7 +12410,7 @@
           <a:p>
             <a:fld id="{081CD680-515F-4816-B907-3B984038F286}" type="datetime1">
               <a:rPr lang="en-US" smtClean="0"/>
-              <a:t>1/28/2023</a:t>
+              <a:t>2/16/2023</a:t>
             </a:fld>
             <a:endParaRPr lang="en-US" dirty="0"/>
           </a:p>
@@ -12880,8 +12880,8 @@
         </p:nvSpPr>
         <p:spPr>
           <a:xfrm>
-            <a:off x="1737360" y="2194561"/>
-            <a:ext cx="7335520" cy="3799840"/>
+            <a:off x="8288114" y="5058076"/>
+            <a:ext cx="3217594" cy="1353624"/>
           </a:xfrm>
         </p:spPr>
         <p:txBody>
@@ -12894,35 +12894,15 @@
               <a:rPr lang="en-IN" sz="2400" dirty="0"/>
               <a:t>PRESENTED BY: </a:t>
             </a:r>
-          </a:p>
-          <a:p>
             <a:r>
               <a:rPr lang="en-IN" sz="2400" b="1" dirty="0"/>
-              <a:t>GROUP 2</a:t>
+              <a:t> </a:t>
             </a:r>
           </a:p>
           <a:p>
             <a:r>
               <a:rPr lang="en-IN" sz="2400" b="1" dirty="0"/>
-              <a:t>1. MD TABISH MAHTAB            2. THARUN DOMMETI   </a:t>
-            </a:r>
-          </a:p>
-          <a:p>
-            <a:r>
-              <a:rPr lang="en-IN" sz="2400" b="1" dirty="0"/>
-              <a:t>3. HEMAA NANDINI. P             4. SHILNA VYSHAK</a:t>
-            </a:r>
-          </a:p>
-          <a:p>
-            <a:r>
-              <a:rPr lang="en-IN" sz="2400" b="1" dirty="0"/>
-              <a:t>5. LAXMAN KUMAR                 6.  HEMANTH DHAKED</a:t>
-            </a:r>
-          </a:p>
-          <a:p>
-            <a:r>
-              <a:rPr lang="en-IN" sz="2400" b="1" dirty="0"/>
-              <a:t>7. MANISH DANGE                   8. PRANjALI</a:t>
+              <a:t>THARUN DOMMETI   </a:t>
             </a:r>
           </a:p>
           <a:p>
@@ -12981,8 +12961,8 @@
         </p:blipFill>
         <p:spPr>
           <a:xfrm>
-            <a:off x="0" y="0"/>
-            <a:ext cx="1066800" cy="1066800"/>
+            <a:off x="2078891" y="2250585"/>
+            <a:ext cx="3907693" cy="3907693"/>
           </a:xfrm>
           <a:prstGeom prst="rect">
             <a:avLst/>
@@ -13002,36 +12982,6 @@
             <a:bevelT prst="angle"/>
             <a:bevelB w="101600" prst="riblet"/>
           </a:sp3d>
-        </p:spPr>
-      </p:pic>
-      <p:pic>
-        <p:nvPicPr>
-          <p:cNvPr id="7" name="Picture 6" descr="Logo, company name&#10;&#10;Description automatically generated">
-            <a:extLst>
-              <a:ext uri="{FF2B5EF4-FFF2-40B4-BE49-F238E27FC236}">
-                <a16:creationId xmlns:a16="http://schemas.microsoft.com/office/drawing/2014/main" id="{D393A044-E52B-40AD-59FC-343DD879A589}"/>
-              </a:ext>
-            </a:extLst>
-          </p:cNvPr>
-          <p:cNvPicPr>
-            <a:picLocks noChangeAspect="1"/>
-          </p:cNvPicPr>
-          <p:nvPr/>
-        </p:nvPicPr>
-        <p:blipFill>
-          <a:blip r:embed="rId4"/>
-          <a:stretch>
-            <a:fillRect/>
-          </a:stretch>
-        </p:blipFill>
-        <p:spPr>
-          <a:xfrm>
-            <a:off x="8718926" y="-1"/>
-            <a:ext cx="3473074" cy="962025"/>
-          </a:xfrm>
-          <a:prstGeom prst="rect">
-            <a:avLst/>
-          </a:prstGeom>
         </p:spPr>
       </p:pic>
     </p:spTree>

</xml_diff>